<commit_message>
update address location information
</commit_message>
<xml_diff>
--- a/topic04-functions-and-lambda-calculus/unit-04a-lectures/talk-3/c-first-class.pptx
+++ b/topic04-functions-and-lambda-calculus/unit-04a-lectures/talk-3/c-first-class.pptx
@@ -8703,8 +8703,8 @@
         </p:nvSpPr>
         <p:spPr>
           <a:xfrm>
-            <a:off x="2052810" y="1244906"/>
-            <a:ext cx="8152483" cy="4832092"/>
+            <a:off x="1153886" y="1244906"/>
+            <a:ext cx="9742714" cy="6124754"/>
           </a:xfrm>
           <a:prstGeom prst="rect">
             <a:avLst/>
@@ -8729,7 +8729,50 @@
           <a:p>
             <a:r>
               <a:rPr lang="en-US" dirty="0"/>
-              <a:t>This function is to take names and addresses from academic colleges(wit, itc, oth), with slightly different rules for different colleges.</a:t>
+              <a:t>This function is to take names and addresses from the three different SETU campuses: </a:t>
+            </a:r>
+          </a:p>
+          <a:p>
+            <a:pPr marL="457200" indent="-457200">
+              <a:buFont typeface="Arial" panose="020B0604020202020204" pitchFamily="34" charset="0"/>
+              <a:buChar char="•"/>
+            </a:pPr>
+            <a:r>
+              <a:rPr lang="en-US" dirty="0"/>
+              <a:t>Waterford Campus , </a:t>
+            </a:r>
+          </a:p>
+          <a:p>
+            <a:pPr marL="457200" indent="-457200">
+              <a:buFont typeface="Arial" panose="020B0604020202020204" pitchFamily="34" charset="0"/>
+              <a:buChar char="•"/>
+            </a:pPr>
+            <a:r>
+              <a:rPr lang="en-US" dirty="0" err="1"/>
+              <a:t>Carlow</a:t>
+            </a:r>
+            <a:r>
+              <a:rPr lang="en-US" dirty="0"/>
+              <a:t> Campus ,</a:t>
+            </a:r>
+          </a:p>
+          <a:p>
+            <a:pPr marL="457200" indent="-457200">
+              <a:buFont typeface="Arial" panose="020B0604020202020204" pitchFamily="34" charset="0"/>
+              <a:buChar char="•"/>
+            </a:pPr>
+            <a:r>
+              <a:rPr lang="en-US" dirty="0"/>
+              <a:t>Wexford Campus</a:t>
+            </a:r>
+          </a:p>
+          <a:p>
+            <a:endParaRPr lang="en-US" dirty="0"/>
+          </a:p>
+          <a:p>
+            <a:r>
+              <a:rPr lang="en-US" dirty="0"/>
+              <a:t>with slightly different rules for different colleges.</a:t>
             </a:r>
           </a:p>
           <a:p>
@@ -8955,33 +8998,100 @@
                                   </p:childTnLst>
                                 </p:cTn>
                               </p:par>
-                            </p:childTnLst>
-                          </p:cTn>
-                        </p:par>
-                      </p:childTnLst>
-                    </p:cTn>
-                  </p:par>
-                  <p:par>
-                    <p:cTn id="13" fill="hold">
-                      <p:stCondLst>
-                        <p:cond delay="indefinite"/>
-                      </p:stCondLst>
-                      <p:childTnLst>
-                        <p:par>
-                          <p:cTn id="14" fill="hold">
-                            <p:stCondLst>
-                              <p:cond delay="0"/>
-                            </p:stCondLst>
-                            <p:childTnLst>
                               <p:par>
-                                <p:cTn id="15" presetID="2" presetClass="entr" presetSubtype="4" fill="hold" nodeType="clickEffect">
+                                <p:cTn id="13" presetID="2" presetClass="entr" presetSubtype="4" fill="hold" nodeType="withEffect">
                                   <p:stCondLst>
                                     <p:cond delay="0"/>
                                   </p:stCondLst>
                                   <p:childTnLst>
                                     <p:set>
                                       <p:cBhvr>
-                                        <p:cTn id="16" dur="1" fill="hold">
+                                        <p:cTn id="14" dur="1" fill="hold">
+                                          <p:stCondLst>
+                                            <p:cond delay="0"/>
+                                          </p:stCondLst>
+                                        </p:cTn>
+                                        <p:tgtEl>
+                                          <p:spTgt spid="3">
+                                            <p:txEl>
+                                              <p:pRg st="2" end="2"/>
+                                            </p:txEl>
+                                          </p:spTgt>
+                                        </p:tgtEl>
+                                        <p:attrNameLst>
+                                          <p:attrName>style.visibility</p:attrName>
+                                        </p:attrNameLst>
+                                      </p:cBhvr>
+                                      <p:to>
+                                        <p:strVal val="visible"/>
+                                      </p:to>
+                                    </p:set>
+                                    <p:anim calcmode="lin" valueType="num">
+                                      <p:cBhvr additive="base">
+                                        <p:cTn id="15" dur="500" fill="hold"/>
+                                        <p:tgtEl>
+                                          <p:spTgt spid="3">
+                                            <p:txEl>
+                                              <p:pRg st="2" end="2"/>
+                                            </p:txEl>
+                                          </p:spTgt>
+                                        </p:tgtEl>
+                                        <p:attrNameLst>
+                                          <p:attrName>ppt_x</p:attrName>
+                                        </p:attrNameLst>
+                                      </p:cBhvr>
+                                      <p:tavLst>
+                                        <p:tav tm="0">
+                                          <p:val>
+                                            <p:strVal val="#ppt_x"/>
+                                          </p:val>
+                                        </p:tav>
+                                        <p:tav tm="100000">
+                                          <p:val>
+                                            <p:strVal val="#ppt_x"/>
+                                          </p:val>
+                                        </p:tav>
+                                      </p:tavLst>
+                                    </p:anim>
+                                    <p:anim calcmode="lin" valueType="num">
+                                      <p:cBhvr additive="base">
+                                        <p:cTn id="16" dur="500" fill="hold"/>
+                                        <p:tgtEl>
+                                          <p:spTgt spid="3">
+                                            <p:txEl>
+                                              <p:pRg st="2" end="2"/>
+                                            </p:txEl>
+                                          </p:spTgt>
+                                        </p:tgtEl>
+                                        <p:attrNameLst>
+                                          <p:attrName>ppt_y</p:attrName>
+                                        </p:attrNameLst>
+                                      </p:cBhvr>
+                                      <p:tavLst>
+                                        <p:tav tm="0">
+                                          <p:val>
+                                            <p:strVal val="1+#ppt_h/2"/>
+                                          </p:val>
+                                        </p:tav>
+                                        <p:tav tm="100000">
+                                          <p:val>
+                                            <p:strVal val="#ppt_y"/>
+                                          </p:val>
+                                        </p:tav>
+                                      </p:tavLst>
+                                    </p:anim>
+                                  </p:childTnLst>
+                                </p:cTn>
+                              </p:par>
+                              <p:par>
+                                <p:cTn id="17" presetID="2" presetClass="entr" presetSubtype="4" fill="hold" nodeType="withEffect">
+                                  <p:stCondLst>
+                                    <p:cond delay="0"/>
+                                  </p:stCondLst>
+                                  <p:childTnLst>
+                                    <p:set>
+                                      <p:cBhvr>
+                                        <p:cTn id="18" dur="1" fill="hold">
                                           <p:stCondLst>
                                             <p:cond delay="0"/>
                                           </p:stCondLst>
@@ -9003,7 +9113,7 @@
                                     </p:set>
                                     <p:anim calcmode="lin" valueType="num">
                                       <p:cBhvr additive="base">
-                                        <p:cTn id="17" dur="500" fill="hold"/>
+                                        <p:cTn id="19" dur="500" fill="hold"/>
                                         <p:tgtEl>
                                           <p:spTgt spid="3">
                                             <p:txEl>
@@ -9030,7 +9140,7 @@
                                     </p:anim>
                                     <p:anim calcmode="lin" valueType="num">
                                       <p:cBhvr additive="base">
-                                        <p:cTn id="18" dur="500" fill="hold"/>
+                                        <p:cTn id="20" dur="500" fill="hold"/>
                                         <p:tgtEl>
                                           <p:spTgt spid="3">
                                             <p:txEl>
@@ -9058,26 +9168,8 @@
                                   </p:childTnLst>
                                 </p:cTn>
                               </p:par>
-                            </p:childTnLst>
-                          </p:cTn>
-                        </p:par>
-                      </p:childTnLst>
-                    </p:cTn>
-                  </p:par>
-                  <p:par>
-                    <p:cTn id="19" fill="hold">
-                      <p:stCondLst>
-                        <p:cond delay="indefinite"/>
-                      </p:stCondLst>
-                      <p:childTnLst>
-                        <p:par>
-                          <p:cTn id="20" fill="hold">
-                            <p:stCondLst>
-                              <p:cond delay="0"/>
-                            </p:stCondLst>
-                            <p:childTnLst>
                               <p:par>
-                                <p:cTn id="21" presetID="2" presetClass="entr" presetSubtype="4" fill="hold" nodeType="clickEffect">
+                                <p:cTn id="21" presetID="2" presetClass="entr" presetSubtype="4" fill="hold" nodeType="withEffect">
                                   <p:stCondLst>
                                     <p:cond delay="0"/>
                                   </p:stCondLst>
@@ -9092,7 +9184,7 @@
                                         <p:tgtEl>
                                           <p:spTgt spid="3">
                                             <p:txEl>
-                                              <p:pRg st="5" end="5"/>
+                                              <p:pRg st="4" end="4"/>
                                             </p:txEl>
                                           </p:spTgt>
                                         </p:tgtEl>
@@ -9110,7 +9202,7 @@
                                         <p:tgtEl>
                                           <p:spTgt spid="3">
                                             <p:txEl>
-                                              <p:pRg st="5" end="5"/>
+                                              <p:pRg st="4" end="4"/>
                                             </p:txEl>
                                           </p:spTgt>
                                         </p:tgtEl>
@@ -9137,7 +9229,298 @@
                                         <p:tgtEl>
                                           <p:spTgt spid="3">
                                             <p:txEl>
-                                              <p:pRg st="5" end="5"/>
+                                              <p:pRg st="4" end="4"/>
+                                            </p:txEl>
+                                          </p:spTgt>
+                                        </p:tgtEl>
+                                        <p:attrNameLst>
+                                          <p:attrName>ppt_y</p:attrName>
+                                        </p:attrNameLst>
+                                      </p:cBhvr>
+                                      <p:tavLst>
+                                        <p:tav tm="0">
+                                          <p:val>
+                                            <p:strVal val="1+#ppt_h/2"/>
+                                          </p:val>
+                                        </p:tav>
+                                        <p:tav tm="100000">
+                                          <p:val>
+                                            <p:strVal val="#ppt_y"/>
+                                          </p:val>
+                                        </p:tav>
+                                      </p:tavLst>
+                                    </p:anim>
+                                  </p:childTnLst>
+                                </p:cTn>
+                              </p:par>
+                              <p:par>
+                                <p:cTn id="25" presetID="2" presetClass="entr" presetSubtype="4" fill="hold" nodeType="withEffect">
+                                  <p:stCondLst>
+                                    <p:cond delay="0"/>
+                                  </p:stCondLst>
+                                  <p:childTnLst>
+                                    <p:set>
+                                      <p:cBhvr>
+                                        <p:cTn id="26" dur="1" fill="hold">
+                                          <p:stCondLst>
+                                            <p:cond delay="0"/>
+                                          </p:stCondLst>
+                                        </p:cTn>
+                                        <p:tgtEl>
+                                          <p:spTgt spid="3">
+                                            <p:txEl>
+                                              <p:pRg st="6" end="6"/>
+                                            </p:txEl>
+                                          </p:spTgt>
+                                        </p:tgtEl>
+                                        <p:attrNameLst>
+                                          <p:attrName>style.visibility</p:attrName>
+                                        </p:attrNameLst>
+                                      </p:cBhvr>
+                                      <p:to>
+                                        <p:strVal val="visible"/>
+                                      </p:to>
+                                    </p:set>
+                                    <p:anim calcmode="lin" valueType="num">
+                                      <p:cBhvr additive="base">
+                                        <p:cTn id="27" dur="500" fill="hold"/>
+                                        <p:tgtEl>
+                                          <p:spTgt spid="3">
+                                            <p:txEl>
+                                              <p:pRg st="6" end="6"/>
+                                            </p:txEl>
+                                          </p:spTgt>
+                                        </p:tgtEl>
+                                        <p:attrNameLst>
+                                          <p:attrName>ppt_x</p:attrName>
+                                        </p:attrNameLst>
+                                      </p:cBhvr>
+                                      <p:tavLst>
+                                        <p:tav tm="0">
+                                          <p:val>
+                                            <p:strVal val="#ppt_x"/>
+                                          </p:val>
+                                        </p:tav>
+                                        <p:tav tm="100000">
+                                          <p:val>
+                                            <p:strVal val="#ppt_x"/>
+                                          </p:val>
+                                        </p:tav>
+                                      </p:tavLst>
+                                    </p:anim>
+                                    <p:anim calcmode="lin" valueType="num">
+                                      <p:cBhvr additive="base">
+                                        <p:cTn id="28" dur="500" fill="hold"/>
+                                        <p:tgtEl>
+                                          <p:spTgt spid="3">
+                                            <p:txEl>
+                                              <p:pRg st="6" end="6"/>
+                                            </p:txEl>
+                                          </p:spTgt>
+                                        </p:tgtEl>
+                                        <p:attrNameLst>
+                                          <p:attrName>ppt_y</p:attrName>
+                                        </p:attrNameLst>
+                                      </p:cBhvr>
+                                      <p:tavLst>
+                                        <p:tav tm="0">
+                                          <p:val>
+                                            <p:strVal val="1+#ppt_h/2"/>
+                                          </p:val>
+                                        </p:tav>
+                                        <p:tav tm="100000">
+                                          <p:val>
+                                            <p:strVal val="#ppt_y"/>
+                                          </p:val>
+                                        </p:tav>
+                                      </p:tavLst>
+                                    </p:anim>
+                                  </p:childTnLst>
+                                </p:cTn>
+                              </p:par>
+                            </p:childTnLst>
+                          </p:cTn>
+                        </p:par>
+                      </p:childTnLst>
+                    </p:cTn>
+                  </p:par>
+                  <p:par>
+                    <p:cTn id="29" fill="hold">
+                      <p:stCondLst>
+                        <p:cond delay="indefinite"/>
+                      </p:stCondLst>
+                      <p:childTnLst>
+                        <p:par>
+                          <p:cTn id="30" fill="hold">
+                            <p:stCondLst>
+                              <p:cond delay="0"/>
+                            </p:stCondLst>
+                            <p:childTnLst>
+                              <p:par>
+                                <p:cTn id="31" presetID="2" presetClass="entr" presetSubtype="4" fill="hold" nodeType="clickEffect">
+                                  <p:stCondLst>
+                                    <p:cond delay="0"/>
+                                  </p:stCondLst>
+                                  <p:childTnLst>
+                                    <p:set>
+                                      <p:cBhvr>
+                                        <p:cTn id="32" dur="1" fill="hold">
+                                          <p:stCondLst>
+                                            <p:cond delay="0"/>
+                                          </p:stCondLst>
+                                        </p:cTn>
+                                        <p:tgtEl>
+                                          <p:spTgt spid="3">
+                                            <p:txEl>
+                                              <p:pRg st="8" end="8"/>
+                                            </p:txEl>
+                                          </p:spTgt>
+                                        </p:tgtEl>
+                                        <p:attrNameLst>
+                                          <p:attrName>style.visibility</p:attrName>
+                                        </p:attrNameLst>
+                                      </p:cBhvr>
+                                      <p:to>
+                                        <p:strVal val="visible"/>
+                                      </p:to>
+                                    </p:set>
+                                    <p:anim calcmode="lin" valueType="num">
+                                      <p:cBhvr additive="base">
+                                        <p:cTn id="33" dur="500" fill="hold"/>
+                                        <p:tgtEl>
+                                          <p:spTgt spid="3">
+                                            <p:txEl>
+                                              <p:pRg st="8" end="8"/>
+                                            </p:txEl>
+                                          </p:spTgt>
+                                        </p:tgtEl>
+                                        <p:attrNameLst>
+                                          <p:attrName>ppt_x</p:attrName>
+                                        </p:attrNameLst>
+                                      </p:cBhvr>
+                                      <p:tavLst>
+                                        <p:tav tm="0">
+                                          <p:val>
+                                            <p:strVal val="#ppt_x"/>
+                                          </p:val>
+                                        </p:tav>
+                                        <p:tav tm="100000">
+                                          <p:val>
+                                            <p:strVal val="#ppt_x"/>
+                                          </p:val>
+                                        </p:tav>
+                                      </p:tavLst>
+                                    </p:anim>
+                                    <p:anim calcmode="lin" valueType="num">
+                                      <p:cBhvr additive="base">
+                                        <p:cTn id="34" dur="500" fill="hold"/>
+                                        <p:tgtEl>
+                                          <p:spTgt spid="3">
+                                            <p:txEl>
+                                              <p:pRg st="8" end="8"/>
+                                            </p:txEl>
+                                          </p:spTgt>
+                                        </p:tgtEl>
+                                        <p:attrNameLst>
+                                          <p:attrName>ppt_y</p:attrName>
+                                        </p:attrNameLst>
+                                      </p:cBhvr>
+                                      <p:tavLst>
+                                        <p:tav tm="0">
+                                          <p:val>
+                                            <p:strVal val="1+#ppt_h/2"/>
+                                          </p:val>
+                                        </p:tav>
+                                        <p:tav tm="100000">
+                                          <p:val>
+                                            <p:strVal val="#ppt_y"/>
+                                          </p:val>
+                                        </p:tav>
+                                      </p:tavLst>
+                                    </p:anim>
+                                  </p:childTnLst>
+                                </p:cTn>
+                              </p:par>
+                            </p:childTnLst>
+                          </p:cTn>
+                        </p:par>
+                      </p:childTnLst>
+                    </p:cTn>
+                  </p:par>
+                  <p:par>
+                    <p:cTn id="35" fill="hold">
+                      <p:stCondLst>
+                        <p:cond delay="indefinite"/>
+                      </p:stCondLst>
+                      <p:childTnLst>
+                        <p:par>
+                          <p:cTn id="36" fill="hold">
+                            <p:stCondLst>
+                              <p:cond delay="0"/>
+                            </p:stCondLst>
+                            <p:childTnLst>
+                              <p:par>
+                                <p:cTn id="37" presetID="2" presetClass="entr" presetSubtype="4" fill="hold" nodeType="clickEffect">
+                                  <p:stCondLst>
+                                    <p:cond delay="0"/>
+                                  </p:stCondLst>
+                                  <p:childTnLst>
+                                    <p:set>
+                                      <p:cBhvr>
+                                        <p:cTn id="38" dur="1" fill="hold">
+                                          <p:stCondLst>
+                                            <p:cond delay="0"/>
+                                          </p:stCondLst>
+                                        </p:cTn>
+                                        <p:tgtEl>
+                                          <p:spTgt spid="3">
+                                            <p:txEl>
+                                              <p:pRg st="10" end="10"/>
+                                            </p:txEl>
+                                          </p:spTgt>
+                                        </p:tgtEl>
+                                        <p:attrNameLst>
+                                          <p:attrName>style.visibility</p:attrName>
+                                        </p:attrNameLst>
+                                      </p:cBhvr>
+                                      <p:to>
+                                        <p:strVal val="visible"/>
+                                      </p:to>
+                                    </p:set>
+                                    <p:anim calcmode="lin" valueType="num">
+                                      <p:cBhvr additive="base">
+                                        <p:cTn id="39" dur="500" fill="hold"/>
+                                        <p:tgtEl>
+                                          <p:spTgt spid="3">
+                                            <p:txEl>
+                                              <p:pRg st="10" end="10"/>
+                                            </p:txEl>
+                                          </p:spTgt>
+                                        </p:tgtEl>
+                                        <p:attrNameLst>
+                                          <p:attrName>ppt_x</p:attrName>
+                                        </p:attrNameLst>
+                                      </p:cBhvr>
+                                      <p:tavLst>
+                                        <p:tav tm="0">
+                                          <p:val>
+                                            <p:strVal val="#ppt_x"/>
+                                          </p:val>
+                                        </p:tav>
+                                        <p:tav tm="100000">
+                                          <p:val>
+                                            <p:strVal val="#ppt_x"/>
+                                          </p:val>
+                                        </p:tav>
+                                      </p:tavLst>
+                                    </p:anim>
+                                    <p:anim calcmode="lin" valueType="num">
+                                      <p:cBhvr additive="base">
+                                        <p:cTn id="40" dur="500" fill="hold"/>
+                                        <p:tgtEl>
+                                          <p:spTgt spid="3">
+                                            <p:txEl>
+                                              <p:pRg st="10" end="10"/>
                                             </p:txEl>
                                           </p:spTgt>
                                         </p:tgtEl>
@@ -9431,7 +9814,7 @@
         <p:spPr>
           <a:xfrm>
             <a:off x="1777389" y="1123721"/>
-            <a:ext cx="9015417" cy="3293209"/>
+            <a:ext cx="7188506" cy="2985433"/>
           </a:xfrm>
           <a:prstGeom prst="rect">
             <a:avLst/>
@@ -9446,7 +9829,7 @@
           <a:p>
             <a:r>
               <a:rPr lang="en-US" sz="2400" b="1" dirty="0"/>
-              <a:t>Waterford Institute of Technology(wit):</a:t>
+              <a:t>SETU (Waterford Campus):</a:t>
             </a:r>
           </a:p>
           <a:p>
@@ -9488,9 +9871,6 @@
             <a:endParaRPr lang="en-US" sz="2000" dirty="0"/>
           </a:p>
           <a:p>
-            <a:endParaRPr lang="en-US" sz="2000" dirty="0"/>
-          </a:p>
-          <a:p>
             <a:r>
               <a:rPr lang="en-US" sz="2000" dirty="0"/>
               <a:t>The remaining part of the address is </a:t>
@@ -9499,7 +9879,7 @@
           <a:p>
             <a:r>
               <a:rPr lang="en-IE" sz="2000" dirty="0"/>
-              <a:t>"Waterford institute of Technology, Cork Road, Waterford, Ireland, X91 K0EK."</a:t>
+              <a:t>”SETU, Cork Road, Waterford, Ireland, X91 K0EK."</a:t>
             </a:r>
           </a:p>
         </p:txBody>
@@ -9518,8 +9898,8 @@
         </p:nvSpPr>
         <p:spPr>
           <a:xfrm>
-            <a:off x="1788407" y="4638103"/>
-            <a:ext cx="7910111" cy="1015663"/>
+            <a:off x="1777389" y="4241357"/>
+            <a:ext cx="7910111" cy="1323439"/>
           </a:xfrm>
           <a:prstGeom prst="rect">
             <a:avLst/>
@@ -9534,7 +9914,7 @@
           <a:p>
             <a:r>
               <a:rPr lang="en-US" sz="2000" dirty="0"/>
-              <a:t>e.g. “Adam Able” from wit would be given the address : </a:t>
+              <a:t>e.g. “Adam Able” from SETU (Waterford)  would be given the address : </a:t>
             </a:r>
           </a:p>
           <a:p>
@@ -9544,7 +9924,7 @@
             </a:r>
             <a:r>
               <a:rPr lang="en-IE" sz="2000" dirty="0"/>
-              <a:t> Waterford institute of Technology, Cork Road, Waterford, Ireland, X91 K0EK."</a:t>
+              <a:t> SETU, Cork Road, Waterford, Ireland, X91 K0EK."</a:t>
             </a:r>
           </a:p>
         </p:txBody>
@@ -9564,7 +9944,7 @@
         <p:spPr>
           <a:xfrm>
             <a:off x="1819622" y="5671852"/>
-            <a:ext cx="7910111" cy="1015663"/>
+            <a:ext cx="7910111" cy="1323439"/>
           </a:xfrm>
           <a:prstGeom prst="rect">
             <a:avLst/>
@@ -9579,7 +9959,7 @@
           <a:p>
             <a:r>
               <a:rPr lang="en-US" sz="2000" dirty="0"/>
-              <a:t>e.g. “Sean Stack” from wit would be given the address : </a:t>
+              <a:t>e.g. “Sean Stack” from SETU (Waterford) would be given the address : </a:t>
             </a:r>
           </a:p>
           <a:p>
@@ -9589,7 +9969,7 @@
             </a:r>
             <a:r>
               <a:rPr lang="en-IE" sz="2000" dirty="0"/>
-              <a:t> Waterford institute of Technology, Cork Road, Waterford, Ireland, X91 K0EK."</a:t>
+              <a:t> SETU, Cork Road, Waterford, Ireland, X91 K0EK."</a:t>
             </a:r>
           </a:p>
         </p:txBody>
@@ -10034,7 +10414,7 @@
                                         <p:tgtEl>
                                           <p:spTgt spid="4">
                                             <p:txEl>
-                                              <p:pRg st="8" end="8"/>
+                                              <p:pRg st="7" end="7"/>
                                             </p:txEl>
                                           </p:spTgt>
                                         </p:tgtEl>
@@ -10052,7 +10432,7 @@
                                         <p:tgtEl>
                                           <p:spTgt spid="4">
                                             <p:txEl>
-                                              <p:pRg st="8" end="8"/>
+                                              <p:pRg st="7" end="7"/>
                                             </p:txEl>
                                           </p:spTgt>
                                         </p:tgtEl>
@@ -10079,7 +10459,7 @@
                                         <p:tgtEl>
                                           <p:spTgt spid="4">
                                             <p:txEl>
-                                              <p:pRg st="8" end="8"/>
+                                              <p:pRg st="7" end="7"/>
                                             </p:txEl>
                                           </p:spTgt>
                                         </p:tgtEl>
@@ -10119,7 +10499,7 @@
                                         <p:tgtEl>
                                           <p:spTgt spid="4">
                                             <p:txEl>
-                                              <p:pRg st="9" end="9"/>
+                                              <p:pRg st="8" end="8"/>
                                             </p:txEl>
                                           </p:spTgt>
                                         </p:tgtEl>
@@ -10137,7 +10517,7 @@
                                         <p:tgtEl>
                                           <p:spTgt spid="4">
                                             <p:txEl>
-                                              <p:pRg st="9" end="9"/>
+                                              <p:pRg st="8" end="8"/>
                                             </p:txEl>
                                           </p:spTgt>
                                         </p:tgtEl>
@@ -10164,7 +10544,7 @@
                                         <p:tgtEl>
                                           <p:spTgt spid="4">
                                             <p:txEl>
-                                              <p:pRg st="9" end="9"/>
+                                              <p:pRg st="8" end="8"/>
                                             </p:txEl>
                                           </p:spTgt>
                                         </p:tgtEl>
@@ -10833,8 +11213,8 @@
         </p:nvSpPr>
         <p:spPr>
           <a:xfrm>
-            <a:off x="1777389" y="936433"/>
-            <a:ext cx="8307659" cy="3539430"/>
+            <a:off x="1821458" y="1215856"/>
+            <a:ext cx="7671844" cy="3108543"/>
           </a:xfrm>
           <a:prstGeom prst="rect">
             <a:avLst/>
@@ -10849,7 +11229,15 @@
           <a:p>
             <a:r>
               <a:rPr lang="en-US" b="1" dirty="0"/>
-              <a:t>Carlow Institute of Technology(itc):</a:t>
+              <a:t>SETU (</a:t>
+            </a:r>
+            <a:r>
+              <a:rPr lang="en-US" b="1" dirty="0" err="1"/>
+              <a:t>Carlow</a:t>
+            </a:r>
+            <a:r>
+              <a:rPr lang="en-US" b="1" dirty="0"/>
+              <a:t> Campus):</a:t>
             </a:r>
           </a:p>
           <a:p>
@@ -10858,7 +11246,15 @@
           <a:p>
             <a:r>
               <a:rPr lang="en-US" dirty="0"/>
-              <a:t>All staff in Carlow Institute of Technology have the </a:t>
+              <a:t>All staff SETU (</a:t>
+            </a:r>
+            <a:r>
+              <a:rPr lang="en-US" dirty="0" err="1"/>
+              <a:t>Carlow</a:t>
+            </a:r>
+            <a:r>
+              <a:rPr lang="en-US" dirty="0"/>
+              <a:t> Campus)  have the </a:t>
             </a:r>
           </a:p>
           <a:p>
@@ -10873,17 +11269,14 @@
           <a:p>
             <a:r>
               <a:rPr lang="en-IE" dirty="0"/>
-              <a:t>"Carlow Institute of Technology, Dublin Road, </a:t>
+              <a:t>"SETU (Carlow Campus), Dublin Road, Carlow, </a:t>
             </a:r>
           </a:p>
           <a:p>
             <a:r>
               <a:rPr lang="en-IE" dirty="0"/>
-              <a:t> Carlow, Ireland, R93 V960."</a:t>
-            </a:r>
-          </a:p>
-          <a:p>
-            <a:endParaRPr lang="en-IE" dirty="0"/>
+              <a:t>Ireland, R93 V960."</a:t>
+            </a:r>
           </a:p>
         </p:txBody>
       </p:sp>
@@ -10902,7 +11295,7 @@
         <p:spPr>
           <a:xfrm>
             <a:off x="1821458" y="4979625"/>
-            <a:ext cx="7910111" cy="1508105"/>
+            <a:ext cx="7910111" cy="1877437"/>
           </a:xfrm>
           <a:prstGeom prst="rect">
             <a:avLst/>
@@ -10917,7 +11310,15 @@
           <a:p>
             <a:r>
               <a:rPr lang="en-US" sz="2400" dirty="0"/>
-              <a:t>e.g. “Adam Able” from itc would be given the address : </a:t>
+              <a:t>e.g. “Adam Able” from SETU (</a:t>
+            </a:r>
+            <a:r>
+              <a:rPr lang="en-US" sz="2400" dirty="0" err="1"/>
+              <a:t>Carlow</a:t>
+            </a:r>
+            <a:r>
+              <a:rPr lang="en-US" sz="2400" dirty="0"/>
+              <a:t>)  would be given the address : </a:t>
             </a:r>
           </a:p>
           <a:p>
@@ -10927,7 +11328,7 @@
             </a:r>
             <a:r>
               <a:rPr lang="en-IE" sz="2400" dirty="0"/>
-              <a:t>Carlow Institute of Technology, Dublin Road, Carlow, Ireland, R93 V960."</a:t>
+              <a:t>SETU, Dublin Road, Carlow, Ireland, R93 V960."</a:t>
             </a:r>
           </a:p>
           <a:p>
@@ -11050,15 +11451,33 @@
                                   </p:childTnLst>
                                 </p:cTn>
                               </p:par>
+                            </p:childTnLst>
+                          </p:cTn>
+                        </p:par>
+                      </p:childTnLst>
+                    </p:cTn>
+                  </p:par>
+                  <p:par>
+                    <p:cTn id="9" fill="hold">
+                      <p:stCondLst>
+                        <p:cond delay="indefinite"/>
+                      </p:stCondLst>
+                      <p:childTnLst>
+                        <p:par>
+                          <p:cTn id="10" fill="hold">
+                            <p:stCondLst>
+                              <p:cond delay="0"/>
+                            </p:stCondLst>
+                            <p:childTnLst>
                               <p:par>
-                                <p:cTn id="9" presetID="2" presetClass="entr" presetSubtype="4" fill="hold" nodeType="withEffect">
+                                <p:cTn id="11" presetID="2" presetClass="entr" presetSubtype="4" fill="hold" nodeType="clickEffect">
                                   <p:stCondLst>
                                     <p:cond delay="0"/>
                                   </p:stCondLst>
                                   <p:childTnLst>
                                     <p:set>
                                       <p:cBhvr>
-                                        <p:cTn id="10" dur="1" fill="hold">
+                                        <p:cTn id="12" dur="1" fill="hold">
                                           <p:stCondLst>
                                             <p:cond delay="0"/>
                                           </p:stCondLst>
@@ -11080,7 +11499,7 @@
                                     </p:set>
                                     <p:anim calcmode="lin" valueType="num">
                                       <p:cBhvr additive="base">
-                                        <p:cTn id="11" dur="500" fill="hold"/>
+                                        <p:cTn id="13" dur="500" fill="hold"/>
                                         <p:tgtEl>
                                           <p:spTgt spid="4">
                                             <p:txEl>
@@ -11107,7 +11526,7 @@
                                     </p:anim>
                                     <p:anim calcmode="lin" valueType="num">
                                       <p:cBhvr additive="base">
-                                        <p:cTn id="12" dur="500" fill="hold"/>
+                                        <p:cTn id="14" dur="500" fill="hold"/>
                                         <p:tgtEl>
                                           <p:spTgt spid="4">
                                             <p:txEl>
@@ -11142,26 +11561,26 @@
                     </p:cTn>
                   </p:par>
                   <p:par>
-                    <p:cTn id="13" fill="hold">
+                    <p:cTn id="15" fill="hold">
                       <p:stCondLst>
                         <p:cond delay="indefinite"/>
                       </p:stCondLst>
                       <p:childTnLst>
                         <p:par>
-                          <p:cTn id="14" fill="hold">
+                          <p:cTn id="16" fill="hold">
                             <p:stCondLst>
                               <p:cond delay="0"/>
                             </p:stCondLst>
                             <p:childTnLst>
                               <p:par>
-                                <p:cTn id="15" presetID="2" presetClass="entr" presetSubtype="4" fill="hold" nodeType="clickEffect">
+                                <p:cTn id="17" presetID="2" presetClass="entr" presetSubtype="4" fill="hold" nodeType="clickEffect">
                                   <p:stCondLst>
                                     <p:cond delay="0"/>
                                   </p:stCondLst>
                                   <p:childTnLst>
                                     <p:set>
                                       <p:cBhvr>
-                                        <p:cTn id="16" dur="1" fill="hold">
+                                        <p:cTn id="18" dur="1" fill="hold">
                                           <p:stCondLst>
                                             <p:cond delay="0"/>
                                           </p:stCondLst>
@@ -11183,7 +11602,7 @@
                                     </p:set>
                                     <p:anim calcmode="lin" valueType="num">
                                       <p:cBhvr additive="base">
-                                        <p:cTn id="17" dur="500" fill="hold"/>
+                                        <p:cTn id="19" dur="500" fill="hold"/>
                                         <p:tgtEl>
                                           <p:spTgt spid="2">
                                             <p:txEl>
@@ -11210,7 +11629,7 @@
                                     </p:anim>
                                     <p:anim calcmode="lin" valueType="num">
                                       <p:cBhvr additive="base">
-                                        <p:cTn id="18" dur="500" fill="hold"/>
+                                        <p:cTn id="20" dur="500" fill="hold"/>
                                         <p:tgtEl>
                                           <p:spTgt spid="2">
                                             <p:txEl>
@@ -11239,14 +11658,14 @@
                                 </p:cTn>
                               </p:par>
                               <p:par>
-                                <p:cTn id="19" presetID="2" presetClass="entr" presetSubtype="4" fill="hold" nodeType="withEffect">
+                                <p:cTn id="21" presetID="2" presetClass="entr" presetSubtype="4" fill="hold" nodeType="withEffect">
                                   <p:stCondLst>
                                     <p:cond delay="0"/>
                                   </p:stCondLst>
                                   <p:childTnLst>
                                     <p:set>
                                       <p:cBhvr>
-                                        <p:cTn id="20" dur="1" fill="hold">
+                                        <p:cTn id="22" dur="1" fill="hold">
                                           <p:stCondLst>
                                             <p:cond delay="0"/>
                                           </p:stCondLst>
@@ -11268,7 +11687,7 @@
                                     </p:set>
                                     <p:anim calcmode="lin" valueType="num">
                                       <p:cBhvr additive="base">
-                                        <p:cTn id="21" dur="500" fill="hold"/>
+                                        <p:cTn id="23" dur="500" fill="hold"/>
                                         <p:tgtEl>
                                           <p:spTgt spid="2">
                                             <p:txEl>
@@ -11295,7 +11714,7 @@
                                     </p:anim>
                                     <p:anim calcmode="lin" valueType="num">
                                       <p:cBhvr additive="base">
-                                        <p:cTn id="22" dur="500" fill="hold"/>
+                                        <p:cTn id="24" dur="500" fill="hold"/>
                                         <p:tgtEl>
                                           <p:spTgt spid="2">
                                             <p:txEl>
@@ -11592,8 +12011,8 @@
         </p:nvSpPr>
         <p:spPr>
           <a:xfrm>
-            <a:off x="1777388" y="936433"/>
-            <a:ext cx="8582141" cy="3970318"/>
+            <a:off x="1219200" y="936433"/>
+            <a:ext cx="9557657" cy="3539430"/>
           </a:xfrm>
           <a:prstGeom prst="rect">
             <a:avLst/>
@@ -11608,7 +12027,7 @@
           <a:p>
             <a:r>
               <a:rPr lang="en-US" b="1" dirty="0"/>
-              <a:t>OTH Regensburg(oth):</a:t>
+              <a:t>SETU (Wexford Campus):</a:t>
             </a:r>
           </a:p>
           <a:p>
@@ -11617,7 +12036,7 @@
           <a:p>
             <a:r>
               <a:rPr lang="en-US" dirty="0"/>
-              <a:t>All staff in OTH Regensburg have the same address:</a:t>
+              <a:t>All staff in the Wexford Campus have the same address:</a:t>
             </a:r>
           </a:p>
           <a:p>
@@ -11626,17 +12045,16 @@
           <a:p>
             <a:r>
               <a:rPr lang="en-IE" dirty="0"/>
-              <a:t>"OTH Regensburg, Seybothstraße 2, </a:t>
-            </a:r>
-          </a:p>
-          <a:p>
+              <a:t>"SETU (Wexford Campus), Summerhill Rd, </a:t>
+            </a:r>
+            <a:r>
+              <a:rPr lang="en-IE" dirty="0" err="1"/>
+              <a:t>Townparks</a:t>
+            </a:r>
             <a:r>
               <a:rPr lang="en-IE" dirty="0"/>
-              <a:t>93053 Regensburg, Germany”.</a:t>
-            </a:r>
-          </a:p>
-          <a:p>
-            <a:endParaRPr lang="en-IE" dirty="0"/>
+              <a:t>, Wexford, Y35 KA07."</a:t>
+            </a:r>
           </a:p>
           <a:p>
             <a:r>
@@ -11661,7 +12079,7 @@
         <p:spPr>
           <a:xfrm>
             <a:off x="1821458" y="4979625"/>
-            <a:ext cx="7910111" cy="1508105"/>
+            <a:ext cx="7910111" cy="1569660"/>
           </a:xfrm>
           <a:prstGeom prst="rect">
             <a:avLst/>
@@ -11676,7 +12094,7 @@
           <a:p>
             <a:r>
               <a:rPr lang="en-US" sz="2400" dirty="0"/>
-              <a:t>e.g. “Adam Able” from oth would be given the address : </a:t>
+              <a:t>e.g. “Adam Able” from SETU (Wexford Campus)  would be given the address : </a:t>
             </a:r>
           </a:p>
           <a:p>
@@ -11686,16 +12104,16 @@
             </a:r>
             <a:r>
               <a:rPr lang="en-IE" sz="2400" dirty="0"/>
-              <a:t>OTH Regensburg, Seybothstraße 2, </a:t>
-            </a:r>
-          </a:p>
-          <a:p>
+              <a:t>SETU (Wexford Campus), Summerhill Rd, </a:t>
+            </a:r>
+            <a:r>
+              <a:rPr lang="en-IE" sz="2400" dirty="0" err="1"/>
+              <a:t>Townparks</a:t>
+            </a:r>
             <a:r>
               <a:rPr lang="en-IE" sz="2400" dirty="0"/>
-              <a:t>93053 Regensburg, Germany”.</a:t>
-            </a:r>
-          </a:p>
-          <a:p>
+              <a:t>, Wexford, Y35 KA07.”</a:t>
+            </a:r>
             <a:endParaRPr lang="en-IE" sz="2000" dirty="0"/>
           </a:p>
         </p:txBody>
@@ -11900,91 +12318,6 @@
                                   </p:childTnLst>
                                 </p:cTn>
                               </p:par>
-                              <p:par>
-                                <p:cTn id="13" presetID="2" presetClass="entr" presetSubtype="4" fill="hold" nodeType="withEffect">
-                                  <p:stCondLst>
-                                    <p:cond delay="0"/>
-                                  </p:stCondLst>
-                                  <p:childTnLst>
-                                    <p:set>
-                                      <p:cBhvr>
-                                        <p:cTn id="14" dur="1" fill="hold">
-                                          <p:stCondLst>
-                                            <p:cond delay="0"/>
-                                          </p:stCondLst>
-                                        </p:cTn>
-                                        <p:tgtEl>
-                                          <p:spTgt spid="4">
-                                            <p:txEl>
-                                              <p:pRg st="7" end="7"/>
-                                            </p:txEl>
-                                          </p:spTgt>
-                                        </p:tgtEl>
-                                        <p:attrNameLst>
-                                          <p:attrName>style.visibility</p:attrName>
-                                        </p:attrNameLst>
-                                      </p:cBhvr>
-                                      <p:to>
-                                        <p:strVal val="visible"/>
-                                      </p:to>
-                                    </p:set>
-                                    <p:anim calcmode="lin" valueType="num">
-                                      <p:cBhvr additive="base">
-                                        <p:cTn id="15" dur="500" fill="hold"/>
-                                        <p:tgtEl>
-                                          <p:spTgt spid="4">
-                                            <p:txEl>
-                                              <p:pRg st="7" end="7"/>
-                                            </p:txEl>
-                                          </p:spTgt>
-                                        </p:tgtEl>
-                                        <p:attrNameLst>
-                                          <p:attrName>ppt_x</p:attrName>
-                                        </p:attrNameLst>
-                                      </p:cBhvr>
-                                      <p:tavLst>
-                                        <p:tav tm="0">
-                                          <p:val>
-                                            <p:strVal val="#ppt_x"/>
-                                          </p:val>
-                                        </p:tav>
-                                        <p:tav tm="100000">
-                                          <p:val>
-                                            <p:strVal val="#ppt_x"/>
-                                          </p:val>
-                                        </p:tav>
-                                      </p:tavLst>
-                                    </p:anim>
-                                    <p:anim calcmode="lin" valueType="num">
-                                      <p:cBhvr additive="base">
-                                        <p:cTn id="16" dur="500" fill="hold"/>
-                                        <p:tgtEl>
-                                          <p:spTgt spid="4">
-                                            <p:txEl>
-                                              <p:pRg st="7" end="7"/>
-                                            </p:txEl>
-                                          </p:spTgt>
-                                        </p:tgtEl>
-                                        <p:attrNameLst>
-                                          <p:attrName>ppt_y</p:attrName>
-                                        </p:attrNameLst>
-                                      </p:cBhvr>
-                                      <p:tavLst>
-                                        <p:tav tm="0">
-                                          <p:val>
-                                            <p:strVal val="1+#ppt_h/2"/>
-                                          </p:val>
-                                        </p:tav>
-                                        <p:tav tm="100000">
-                                          <p:val>
-                                            <p:strVal val="#ppt_y"/>
-                                          </p:val>
-                                        </p:tav>
-                                      </p:tavLst>
-                                    </p:anim>
-                                  </p:childTnLst>
-                                </p:cTn>
-                              </p:par>
                             </p:childTnLst>
                           </p:cTn>
                         </p:par>
@@ -11992,26 +12325,26 @@
                     </p:cTn>
                   </p:par>
                   <p:par>
-                    <p:cTn id="17" fill="hold">
+                    <p:cTn id="13" fill="hold">
                       <p:stCondLst>
                         <p:cond delay="indefinite"/>
                       </p:stCondLst>
                       <p:childTnLst>
                         <p:par>
-                          <p:cTn id="18" fill="hold">
+                          <p:cTn id="14" fill="hold">
                             <p:stCondLst>
                               <p:cond delay="0"/>
                             </p:stCondLst>
                             <p:childTnLst>
                               <p:par>
-                                <p:cTn id="19" presetID="2" presetClass="entr" presetSubtype="4" fill="hold" nodeType="clickEffect">
+                                <p:cTn id="15" presetID="2" presetClass="entr" presetSubtype="4" fill="hold" nodeType="clickEffect">
                                   <p:stCondLst>
                                     <p:cond delay="0"/>
                                   </p:stCondLst>
                                   <p:childTnLst>
                                     <p:set>
                                       <p:cBhvr>
-                                        <p:cTn id="20" dur="1" fill="hold">
+                                        <p:cTn id="16" dur="1" fill="hold">
                                           <p:stCondLst>
                                             <p:cond delay="0"/>
                                           </p:stCondLst>
@@ -12033,7 +12366,7 @@
                                     </p:set>
                                     <p:anim calcmode="lin" valueType="num">
                                       <p:cBhvr additive="base">
-                                        <p:cTn id="21" dur="500" fill="hold"/>
+                                        <p:cTn id="17" dur="500" fill="hold"/>
                                         <p:tgtEl>
                                           <p:spTgt spid="2">
                                             <p:txEl>
@@ -12060,7 +12393,7 @@
                                     </p:anim>
                                     <p:anim calcmode="lin" valueType="num">
                                       <p:cBhvr additive="base">
-                                        <p:cTn id="22" dur="500" fill="hold"/>
+                                        <p:cTn id="18" dur="500" fill="hold"/>
                                         <p:tgtEl>
                                           <p:spTgt spid="2">
                                             <p:txEl>
@@ -12089,14 +12422,14 @@
                                 </p:cTn>
                               </p:par>
                               <p:par>
-                                <p:cTn id="23" presetID="2" presetClass="entr" presetSubtype="4" fill="hold" nodeType="withEffect">
+                                <p:cTn id="19" presetID="2" presetClass="entr" presetSubtype="4" fill="hold" nodeType="withEffect">
                                   <p:stCondLst>
                                     <p:cond delay="0"/>
                                   </p:stCondLst>
                                   <p:childTnLst>
                                     <p:set>
                                       <p:cBhvr>
-                                        <p:cTn id="24" dur="1" fill="hold">
+                                        <p:cTn id="20" dur="1" fill="hold">
                                           <p:stCondLst>
                                             <p:cond delay="0"/>
                                           </p:stCondLst>
@@ -12118,7 +12451,7 @@
                                     </p:set>
                                     <p:anim calcmode="lin" valueType="num">
                                       <p:cBhvr additive="base">
-                                        <p:cTn id="25" dur="500" fill="hold"/>
+                                        <p:cTn id="21" dur="500" fill="hold"/>
                                         <p:tgtEl>
                                           <p:spTgt spid="2">
                                             <p:txEl>
@@ -12145,96 +12478,11 @@
                                     </p:anim>
                                     <p:anim calcmode="lin" valueType="num">
                                       <p:cBhvr additive="base">
-                                        <p:cTn id="26" dur="500" fill="hold"/>
+                                        <p:cTn id="22" dur="500" fill="hold"/>
                                         <p:tgtEl>
                                           <p:spTgt spid="2">
                                             <p:txEl>
                                               <p:pRg st="1" end="1"/>
-                                            </p:txEl>
-                                          </p:spTgt>
-                                        </p:tgtEl>
-                                        <p:attrNameLst>
-                                          <p:attrName>ppt_y</p:attrName>
-                                        </p:attrNameLst>
-                                      </p:cBhvr>
-                                      <p:tavLst>
-                                        <p:tav tm="0">
-                                          <p:val>
-                                            <p:strVal val="1+#ppt_h/2"/>
-                                          </p:val>
-                                        </p:tav>
-                                        <p:tav tm="100000">
-                                          <p:val>
-                                            <p:strVal val="#ppt_y"/>
-                                          </p:val>
-                                        </p:tav>
-                                      </p:tavLst>
-                                    </p:anim>
-                                  </p:childTnLst>
-                                </p:cTn>
-                              </p:par>
-                              <p:par>
-                                <p:cTn id="27" presetID="2" presetClass="entr" presetSubtype="4" fill="hold" nodeType="withEffect">
-                                  <p:stCondLst>
-                                    <p:cond delay="0"/>
-                                  </p:stCondLst>
-                                  <p:childTnLst>
-                                    <p:set>
-                                      <p:cBhvr>
-                                        <p:cTn id="28" dur="1" fill="hold">
-                                          <p:stCondLst>
-                                            <p:cond delay="0"/>
-                                          </p:stCondLst>
-                                        </p:cTn>
-                                        <p:tgtEl>
-                                          <p:spTgt spid="2">
-                                            <p:txEl>
-                                              <p:pRg st="2" end="2"/>
-                                            </p:txEl>
-                                          </p:spTgt>
-                                        </p:tgtEl>
-                                        <p:attrNameLst>
-                                          <p:attrName>style.visibility</p:attrName>
-                                        </p:attrNameLst>
-                                      </p:cBhvr>
-                                      <p:to>
-                                        <p:strVal val="visible"/>
-                                      </p:to>
-                                    </p:set>
-                                    <p:anim calcmode="lin" valueType="num">
-                                      <p:cBhvr additive="base">
-                                        <p:cTn id="29" dur="500" fill="hold"/>
-                                        <p:tgtEl>
-                                          <p:spTgt spid="2">
-                                            <p:txEl>
-                                              <p:pRg st="2" end="2"/>
-                                            </p:txEl>
-                                          </p:spTgt>
-                                        </p:tgtEl>
-                                        <p:attrNameLst>
-                                          <p:attrName>ppt_x</p:attrName>
-                                        </p:attrNameLst>
-                                      </p:cBhvr>
-                                      <p:tavLst>
-                                        <p:tav tm="0">
-                                          <p:val>
-                                            <p:strVal val="#ppt_x"/>
-                                          </p:val>
-                                        </p:tav>
-                                        <p:tav tm="100000">
-                                          <p:val>
-                                            <p:strVal val="#ppt_x"/>
-                                          </p:val>
-                                        </p:tav>
-                                      </p:tavLst>
-                                    </p:anim>
-                                    <p:anim calcmode="lin" valueType="num">
-                                      <p:cBhvr additive="base">
-                                        <p:cTn id="30" dur="500" fill="hold"/>
-                                        <p:tgtEl>
-                                          <p:spTgt spid="2">
-                                            <p:txEl>
-                                              <p:pRg st="2" end="2"/>
                                             </p:txEl>
                                           </p:spTgt>
                                         </p:tgtEl>
@@ -14284,8 +14532,8 @@
         </p:nvSpPr>
         <p:spPr>
           <a:xfrm>
-            <a:off x="1854914" y="1331001"/>
-            <a:ext cx="8440553" cy="5262979"/>
+            <a:off x="968830" y="1331001"/>
+            <a:ext cx="9326638" cy="5324535"/>
           </a:xfrm>
           <a:prstGeom prst="rect">
             <a:avLst/>
@@ -14304,28 +14552,101 @@
             </a:r>
           </a:p>
           <a:p>
+            <a:pPr marL="1371600" lvl="2" indent="-457200">
+              <a:buFont typeface="Arial" panose="020B0604020202020204" pitchFamily="34" charset="0"/>
+              <a:buChar char="•"/>
+            </a:pPr>
+            <a:r>
+              <a:rPr lang="en-US" sz="2400" dirty="0"/>
+              <a:t>location</a:t>
+            </a:r>
+          </a:p>
+          <a:p>
+            <a:pPr marL="1371600" lvl="2" indent="-457200">
+              <a:buFont typeface="Arial" panose="020B0604020202020204" pitchFamily="34" charset="0"/>
+              <a:buChar char="•"/>
+            </a:pPr>
+            <a:r>
+              <a:rPr lang="en-US" sz="2400" dirty="0"/>
+              <a:t>name (not so obvious but in case of SETU ( Waterford Campus) , the address depends also on name)</a:t>
+            </a:r>
+          </a:p>
+          <a:p>
+            <a:endParaRPr lang="en-US" dirty="0"/>
+          </a:p>
+          <a:p>
             <a:r>
               <a:rPr lang="en-US" dirty="0"/>
-              <a:t>	- location</a:t>
-            </a:r>
-          </a:p>
-          <a:p>
+              <a:t>We will use the </a:t>
+            </a:r>
+            <a:r>
+              <a:rPr lang="en-US" dirty="0" err="1"/>
+              <a:t>folloing</a:t>
+            </a:r>
             <a:r>
               <a:rPr lang="en-US" dirty="0"/>
-              <a:t>	- name (not so obvious but in case of wit, the address depends also on name)</a:t>
-            </a:r>
-          </a:p>
-          <a:p>
-            <a:endParaRPr lang="en-US" dirty="0"/>
+              <a:t> ‘key’s to indicate the locations. ”</a:t>
+            </a:r>
+          </a:p>
+          <a:p>
+            <a:pPr marL="1371600" lvl="2" indent="-457200">
+              <a:buFont typeface="Arial" panose="020B0604020202020204" pitchFamily="34" charset="0"/>
+              <a:buChar char="•"/>
+            </a:pPr>
+            <a:r>
+              <a:rPr lang="en-US" sz="2400" dirty="0"/>
+              <a:t> </a:t>
+            </a:r>
+            <a:r>
+              <a:rPr lang="en-US" sz="2400" dirty="0" err="1"/>
+              <a:t>WatSETU</a:t>
+            </a:r>
+            <a:r>
+              <a:rPr lang="en-US" sz="2400" dirty="0"/>
+              <a:t>”, </a:t>
+            </a:r>
+          </a:p>
+          <a:p>
+            <a:pPr marL="1371600" lvl="2" indent="-457200">
+              <a:buFont typeface="Arial" panose="020B0604020202020204" pitchFamily="34" charset="0"/>
+              <a:buChar char="•"/>
+            </a:pPr>
+            <a:r>
+              <a:rPr lang="en-US" sz="2400" dirty="0"/>
+              <a:t>“</a:t>
+            </a:r>
+            <a:r>
+              <a:rPr lang="en-US" sz="2400" dirty="0" err="1"/>
+              <a:t>CarSETU</a:t>
+            </a:r>
+            <a:r>
+              <a:rPr lang="en-US" sz="2400" dirty="0"/>
+              <a:t>” and </a:t>
+            </a:r>
+          </a:p>
+          <a:p>
+            <a:pPr marL="1371600" lvl="2" indent="-457200">
+              <a:buFont typeface="Arial" panose="020B0604020202020204" pitchFamily="34" charset="0"/>
+              <a:buChar char="•"/>
+            </a:pPr>
+            <a:r>
+              <a:rPr lang="en-US" sz="2400" dirty="0"/>
+              <a:t>“</a:t>
+            </a:r>
+            <a:r>
+              <a:rPr lang="en-US" sz="2400" dirty="0" err="1"/>
+              <a:t>WexSETU</a:t>
+            </a:r>
+            <a:r>
+              <a:rPr lang="en-US" sz="2400" dirty="0"/>
+              <a:t>”   </a:t>
+            </a:r>
           </a:p>
           <a:p>
             <a:r>
               <a:rPr lang="en-US" dirty="0"/>
-              <a:t>We will use ‘key’s (”wit”, “itc”, “oth”) to indicate the locations. </a:t>
-            </a:r>
-          </a:p>
-          <a:p>
-            <a:endParaRPr lang="en-US" dirty="0"/>
+              <a:t> </a:t>
+            </a:r>
           </a:p>
           <a:p>
             <a:r>
@@ -14664,36 +14985,6 @@
           </a:p>
         </p:txBody>
       </p:sp>
-      <p:pic>
-        <p:nvPicPr>
-          <p:cNvPr id="3" name="Picture 2">
-            <a:extLst>
-              <a:ext uri="{FF2B5EF4-FFF2-40B4-BE49-F238E27FC236}">
-                <a16:creationId xmlns:a16="http://schemas.microsoft.com/office/drawing/2014/main" id="{B49C0CB9-C74A-DF45-92D6-65B0D06C1C0B}"/>
-              </a:ext>
-            </a:extLst>
-          </p:cNvPr>
-          <p:cNvPicPr>
-            <a:picLocks noChangeAspect="1"/>
-          </p:cNvPicPr>
-          <p:nvPr/>
-        </p:nvPicPr>
-        <p:blipFill>
-          <a:blip r:embed="rId2"/>
-          <a:stretch>
-            <a:fillRect/>
-          </a:stretch>
-        </p:blipFill>
-        <p:spPr>
-          <a:xfrm>
-            <a:off x="0" y="4607983"/>
-            <a:ext cx="12289545" cy="1725083"/>
-          </a:xfrm>
-          <a:prstGeom prst="rect">
-            <a:avLst/>
-          </a:prstGeom>
-        </p:spPr>
-      </p:pic>
       <p:sp>
         <p:nvSpPr>
           <p:cNvPr id="4" name="TextBox 3">
@@ -14732,6 +15023,36 @@
           </a:p>
         </p:txBody>
       </p:sp>
+      <p:pic>
+        <p:nvPicPr>
+          <p:cNvPr id="6" name="Picture 5">
+            <a:extLst>
+              <a:ext uri="{FF2B5EF4-FFF2-40B4-BE49-F238E27FC236}">
+                <a16:creationId xmlns:a16="http://schemas.microsoft.com/office/drawing/2014/main" id="{9A5EE112-884F-9AFF-9B79-80EDAF0B06FE}"/>
+              </a:ext>
+            </a:extLst>
+          </p:cNvPr>
+          <p:cNvPicPr>
+            <a:picLocks noChangeAspect="1"/>
+          </p:cNvPicPr>
+          <p:nvPr/>
+        </p:nvPicPr>
+        <p:blipFill>
+          <a:blip r:embed="rId2"/>
+          <a:stretch>
+            <a:fillRect/>
+          </a:stretch>
+        </p:blipFill>
+        <p:spPr>
+          <a:xfrm>
+            <a:off x="794657" y="4408508"/>
+            <a:ext cx="10276114" cy="2141369"/>
+          </a:xfrm>
+          <a:prstGeom prst="rect">
+            <a:avLst/>
+          </a:prstGeom>
+        </p:spPr>
+      </p:pic>
     </p:spTree>
     <p:extLst>
       <p:ext uri="{BB962C8B-B14F-4D97-AF65-F5344CB8AC3E}">
@@ -14905,79 +15226,6 @@
                                         <p:cTn id="14" dur="500" fill="hold"/>
                                         <p:tgtEl>
                                           <p:spTgt spid="4"/>
-                                        </p:tgtEl>
-                                        <p:attrNameLst>
-                                          <p:attrName>ppt_y</p:attrName>
-                                        </p:attrNameLst>
-                                      </p:cBhvr>
-                                      <p:tavLst>
-                                        <p:tav tm="0">
-                                          <p:val>
-                                            <p:strVal val="1+#ppt_h/2"/>
-                                          </p:val>
-                                        </p:tav>
-                                        <p:tav tm="100000">
-                                          <p:val>
-                                            <p:strVal val="#ppt_y"/>
-                                          </p:val>
-                                        </p:tav>
-                                      </p:tavLst>
-                                    </p:anim>
-                                  </p:childTnLst>
-                                </p:cTn>
-                              </p:par>
-                              <p:par>
-                                <p:cTn id="15" presetID="2" presetClass="entr" presetSubtype="4" fill="hold" nodeType="withEffect">
-                                  <p:stCondLst>
-                                    <p:cond delay="0"/>
-                                  </p:stCondLst>
-                                  <p:childTnLst>
-                                    <p:set>
-                                      <p:cBhvr>
-                                        <p:cTn id="16" dur="1" fill="hold">
-                                          <p:stCondLst>
-                                            <p:cond delay="0"/>
-                                          </p:stCondLst>
-                                        </p:cTn>
-                                        <p:tgtEl>
-                                          <p:spTgt spid="3"/>
-                                        </p:tgtEl>
-                                        <p:attrNameLst>
-                                          <p:attrName>style.visibility</p:attrName>
-                                        </p:attrNameLst>
-                                      </p:cBhvr>
-                                      <p:to>
-                                        <p:strVal val="visible"/>
-                                      </p:to>
-                                    </p:set>
-                                    <p:anim calcmode="lin" valueType="num">
-                                      <p:cBhvr additive="base">
-                                        <p:cTn id="17" dur="500" fill="hold"/>
-                                        <p:tgtEl>
-                                          <p:spTgt spid="3"/>
-                                        </p:tgtEl>
-                                        <p:attrNameLst>
-                                          <p:attrName>ppt_x</p:attrName>
-                                        </p:attrNameLst>
-                                      </p:cBhvr>
-                                      <p:tavLst>
-                                        <p:tav tm="0">
-                                          <p:val>
-                                            <p:strVal val="#ppt_x"/>
-                                          </p:val>
-                                        </p:tav>
-                                        <p:tav tm="100000">
-                                          <p:val>
-                                            <p:strVal val="#ppt_x"/>
-                                          </p:val>
-                                        </p:tav>
-                                      </p:tavLst>
-                                    </p:anim>
-                                    <p:anim calcmode="lin" valueType="num">
-                                      <p:cBhvr additive="base">
-                                        <p:cTn id="18" dur="500" fill="hold"/>
-                                        <p:tgtEl>
-                                          <p:spTgt spid="3"/>
                                         </p:tgtEl>
                                         <p:attrNameLst>
                                           <p:attrName>ppt_y</p:attrName>
@@ -15270,8 +15518,8 @@
         </p:nvSpPr>
         <p:spPr bwMode="auto">
           <a:xfrm>
-            <a:off x="0" y="2354670"/>
-            <a:ext cx="12310533" cy="3108543"/>
+            <a:off x="0" y="2754779"/>
+            <a:ext cx="12310533" cy="2308324"/>
           </a:xfrm>
           <a:prstGeom prst="rect">
             <a:avLst/>
@@ -15291,42 +15539,91 @@
           <a:lstStyle/>
           <a:p>
             <a:r>
-              <a:rPr lang="en-IE" b="1" dirty="0"/>
+              <a:rPr lang="en-IE" sz="2400" b="1" dirty="0" err="1"/>
               <a:t>getLocation</a:t>
             </a:r>
             <a:r>
-              <a:rPr lang="en-IE" dirty="0"/>
+              <a:rPr lang="en-IE" sz="2400" dirty="0"/>
               <a:t> :: String -&gt; (Name -&gt; String)</a:t>
             </a:r>
           </a:p>
           <a:p>
             <a:r>
-              <a:rPr lang="en-IE" dirty="0"/>
-              <a:t>getLocation location = case location of </a:t>
-            </a:r>
-          </a:p>
-          <a:p>
-            <a:r>
-              <a:rPr lang="en-IE" dirty="0"/>
-              <a:t>	"wit" -&gt; witOffice </a:t>
-            </a:r>
-          </a:p>
-          <a:p>
-            <a:r>
-              <a:rPr lang="en-IE" dirty="0"/>
-              <a:t>	"itc" -&gt; itcOffice </a:t>
-            </a:r>
-          </a:p>
-          <a:p>
-            <a:r>
-              <a:rPr lang="en-IE" dirty="0"/>
-              <a:t>	"oth" -&gt; othOffice </a:t>
-            </a:r>
-          </a:p>
-          <a:p>
-            <a:r>
-              <a:rPr lang="en-IE" dirty="0"/>
-              <a:t>	_ -&gt; (\name -&gt; fst name ++ " " ++ snd name 						++ ": Address unknown" ) </a:t>
+              <a:rPr lang="en-IE" sz="2400" dirty="0" err="1"/>
+              <a:t>getLocation</a:t>
+            </a:r>
+            <a:r>
+              <a:rPr lang="en-IE" sz="2400" dirty="0"/>
+              <a:t> location   = case location  of </a:t>
+            </a:r>
+          </a:p>
+          <a:p>
+            <a:r>
+              <a:rPr lang="en-IE" sz="2400" dirty="0"/>
+              <a:t>        "Wat(SETU)" -&gt; </a:t>
+            </a:r>
+            <a:r>
+              <a:rPr lang="en-IE" sz="2400" dirty="0" err="1"/>
+              <a:t>watOffice</a:t>
+            </a:r>
+            <a:r>
+              <a:rPr lang="en-IE" sz="2400" dirty="0"/>
+              <a:t> </a:t>
+            </a:r>
+          </a:p>
+          <a:p>
+            <a:r>
+              <a:rPr lang="en-IE" sz="2400" dirty="0"/>
+              <a:t>        "Car(SETU)" -&gt; </a:t>
+            </a:r>
+            <a:r>
+              <a:rPr lang="en-IE" sz="2400" dirty="0" err="1"/>
+              <a:t>carOffice</a:t>
+            </a:r>
+            <a:endParaRPr lang="en-IE" sz="2400" dirty="0"/>
+          </a:p>
+          <a:p>
+            <a:r>
+              <a:rPr lang="en-IE" sz="2400" dirty="0"/>
+              <a:t>        "</a:t>
+            </a:r>
+            <a:r>
+              <a:rPr lang="en-IE" sz="2400" dirty="0" err="1"/>
+              <a:t>Wex</a:t>
+            </a:r>
+            <a:r>
+              <a:rPr lang="en-IE" sz="2400" dirty="0"/>
+              <a:t>(SETU)" -&gt; </a:t>
+            </a:r>
+            <a:r>
+              <a:rPr lang="en-IE" sz="2400" dirty="0" err="1"/>
+              <a:t>wexOffice</a:t>
+            </a:r>
+            <a:r>
+              <a:rPr lang="en-IE" sz="2400" dirty="0"/>
+              <a:t> </a:t>
+            </a:r>
+          </a:p>
+          <a:p>
+            <a:r>
+              <a:rPr lang="en-IE" sz="2400" dirty="0"/>
+              <a:t>                _     -&gt; (\name -&gt; </a:t>
+            </a:r>
+            <a:r>
+              <a:rPr lang="en-IE" sz="2400" dirty="0" err="1"/>
+              <a:t>fst</a:t>
+            </a:r>
+            <a:r>
+              <a:rPr lang="en-IE" sz="2400" dirty="0"/>
+              <a:t> name ++ "  " ++ </a:t>
+            </a:r>
+            <a:r>
+              <a:rPr lang="en-IE" sz="2400" dirty="0" err="1"/>
+              <a:t>snd</a:t>
+            </a:r>
+            <a:r>
+              <a:rPr lang="en-IE" sz="2400" dirty="0"/>
+              <a:t> name ++ ": Address unknown" )</a:t>
             </a:r>
           </a:p>
         </p:txBody>
@@ -15350,8 +15647,8 @@
           </a:xfrm>
           <a:prstGeom prst="wedgeEllipseCallout">
             <a:avLst>
-              <a:gd name="adj1" fmla="val -102534"/>
-              <a:gd name="adj2" fmla="val 2787"/>
+              <a:gd name="adj1" fmla="val -139046"/>
+              <a:gd name="adj2" fmla="val 13637"/>
             </a:avLst>
           </a:prstGeom>
           <a:solidFill>
@@ -15452,8 +15749,8 @@
           </a:xfrm>
           <a:prstGeom prst="wedgeEllipseCallout">
             <a:avLst>
-              <a:gd name="adj1" fmla="val -140321"/>
-              <a:gd name="adj2" fmla="val -59031"/>
+              <a:gd name="adj1" fmla="val -129715"/>
+              <a:gd name="adj2" fmla="val -58386"/>
             </a:avLst>
           </a:prstGeom>
           <a:solidFill>
@@ -16113,54 +16410,136 @@
           <a:lstStyle/>
           <a:p>
             <a:r>
+              <a:rPr lang="en-IE" b="1" dirty="0" err="1"/>
+              <a:t>watOffice</a:t>
+            </a:r>
+            <a:r>
               <a:rPr lang="en-IE" b="1" dirty="0"/>
-              <a:t>witOffice</a:t>
+              <a:t> </a:t>
             </a:r>
             <a:r>
               <a:rPr lang="en-IE" dirty="0"/>
-              <a:t> :: Name -&gt; String</a:t>
-            </a:r>
-          </a:p>
-          <a:p>
+              <a:t>:: Name -&gt; String</a:t>
+            </a:r>
+          </a:p>
+          <a:p>
+            <a:r>
+              <a:rPr lang="en-IE" dirty="0" err="1"/>
+              <a:t>watOffice</a:t>
+            </a:r>
             <a:r>
               <a:rPr lang="en-IE" dirty="0"/>
-              <a:t>witOffice name =</a:t>
+              <a:t> name =</a:t>
             </a:r>
           </a:p>
           <a:p>
             <a:r>
               <a:rPr lang="en-IE" dirty="0"/>
-              <a:t>	if lastName &lt; "L"</a:t>
-            </a:r>
-          </a:p>
-          <a:p>
+              <a:t>  if </a:t>
+            </a:r>
+            <a:r>
+              <a:rPr lang="en-IE" dirty="0" err="1"/>
+              <a:t>lastName</a:t>
+            </a:r>
             <a:r>
               <a:rPr lang="en-IE" dirty="0"/>
-              <a:t>		then nametext ++ ", Lower Floor, Main Building " ++ office Wit</a:t>
+              <a:t> &lt; "L"</a:t>
             </a:r>
           </a:p>
           <a:p>
             <a:r>
               <a:rPr lang="en-IE" dirty="0"/>
-              <a:t>		else nametext ++ ", Top Floor, Main Building " ++ office Wit</a:t>
-            </a:r>
-          </a:p>
-          <a:p>
+              <a:t>    then </a:t>
+            </a:r>
+            <a:r>
+              <a:rPr lang="en-IE" dirty="0" err="1"/>
+              <a:t>nametext</a:t>
+            </a:r>
             <a:r>
               <a:rPr lang="en-IE" dirty="0"/>
-              <a:t>	where</a:t>
-            </a:r>
+              <a:t> ++ ",  Lower Floor, Main Building  " ++ office </a:t>
+            </a:r>
+            <a:r>
+              <a:rPr lang="en-IE" dirty="0" err="1"/>
+              <a:t>WatSETU</a:t>
+            </a:r>
+            <a:endParaRPr lang="en-IE" dirty="0"/>
           </a:p>
           <a:p>
             <a:r>
               <a:rPr lang="en-IE" dirty="0"/>
-              <a:t>		nametext = fst name ++ " " ++ snd name</a:t>
-            </a:r>
-          </a:p>
-          <a:p>
+              <a:t>    else </a:t>
+            </a:r>
+            <a:r>
+              <a:rPr lang="en-IE" dirty="0" err="1"/>
+              <a:t>nametext</a:t>
+            </a:r>
             <a:r>
               <a:rPr lang="en-IE" dirty="0"/>
-              <a:t>		lastName = snd name</a:t>
+              <a:t> ++ ",  Top Floor, Main Building  " ++ office </a:t>
+            </a:r>
+            <a:r>
+              <a:rPr lang="en-IE" dirty="0" err="1"/>
+              <a:t>WatSETU</a:t>
+            </a:r>
+            <a:endParaRPr lang="en-IE" dirty="0"/>
+          </a:p>
+          <a:p>
+            <a:r>
+              <a:rPr lang="en-IE" dirty="0"/>
+              <a:t>  where</a:t>
+            </a:r>
+          </a:p>
+          <a:p>
+            <a:r>
+              <a:rPr lang="en-IE" dirty="0"/>
+              <a:t>    </a:t>
+            </a:r>
+            <a:r>
+              <a:rPr lang="en-IE" dirty="0" err="1"/>
+              <a:t>nametext</a:t>
+            </a:r>
+            <a:r>
+              <a:rPr lang="en-IE" dirty="0"/>
+              <a:t> = </a:t>
+            </a:r>
+            <a:r>
+              <a:rPr lang="en-IE" dirty="0" err="1"/>
+              <a:t>fst</a:t>
+            </a:r>
+            <a:r>
+              <a:rPr lang="en-IE" dirty="0"/>
+              <a:t> name ++ "  " ++ </a:t>
+            </a:r>
+            <a:r>
+              <a:rPr lang="en-IE" dirty="0" err="1"/>
+              <a:t>snd</a:t>
+            </a:r>
+            <a:r>
+              <a:rPr lang="en-IE" dirty="0"/>
+              <a:t> name</a:t>
+            </a:r>
+          </a:p>
+          <a:p>
+            <a:r>
+              <a:rPr lang="en-IE" dirty="0"/>
+              <a:t>    </a:t>
+            </a:r>
+            <a:r>
+              <a:rPr lang="en-IE" dirty="0" err="1"/>
+              <a:t>lastName</a:t>
+            </a:r>
+            <a:r>
+              <a:rPr lang="en-IE" dirty="0"/>
+              <a:t> = </a:t>
+            </a:r>
+            <a:r>
+              <a:rPr lang="en-IE" dirty="0" err="1"/>
+              <a:t>snd</a:t>
+            </a:r>
+            <a:r>
+              <a:rPr lang="en-IE" dirty="0"/>
+              <a:t> name</a:t>
             </a:r>
           </a:p>
         </p:txBody>
@@ -16415,7 +16794,7 @@
         <p:spPr bwMode="auto">
           <a:xfrm>
             <a:off x="1490134" y="4394091"/>
-            <a:ext cx="8415867" cy="1815882"/>
+            <a:ext cx="9547980" cy="1815882"/>
           </a:xfrm>
           <a:prstGeom prst="rect">
             <a:avLst/>
@@ -16435,8 +16814,8 @@
           <a:lstStyle/>
           <a:p>
             <a:r>
-              <a:rPr lang="en-IE" b="1" dirty="0"/>
-              <a:t>othOffice</a:t>
+              <a:rPr lang="en-IE" b="1" dirty="0" err="1"/>
+              <a:t>wexOffice</a:t>
             </a:r>
             <a:r>
               <a:rPr lang="en-IE" dirty="0"/>
@@ -16445,20 +16824,61 @@
           </a:p>
           <a:p>
             <a:r>
+              <a:rPr lang="en-IE" dirty="0" err="1"/>
+              <a:t>wexOffice</a:t>
+            </a:r>
+            <a:r>
               <a:rPr lang="en-IE" dirty="0"/>
-              <a:t>othOffice name = nametext ++ ", " ++ office Oth</a:t>
-            </a:r>
-          </a:p>
-          <a:p>
+              <a:t> name =  </a:t>
+            </a:r>
+            <a:r>
+              <a:rPr lang="en-IE" dirty="0" err="1"/>
+              <a:t>nametext</a:t>
+            </a:r>
             <a:r>
               <a:rPr lang="en-IE" dirty="0"/>
-              <a:t>   where</a:t>
-            </a:r>
+              <a:t> ++ ",  " ++ office </a:t>
+            </a:r>
+            <a:r>
+              <a:rPr lang="en-IE" dirty="0" err="1"/>
+              <a:t>WexSETU</a:t>
+            </a:r>
+            <a:endParaRPr lang="en-IE" dirty="0"/>
           </a:p>
           <a:p>
             <a:r>
               <a:rPr lang="en-IE" dirty="0"/>
-              <a:t>        nametext = snd name ++ ", " ++ fst name</a:t>
+              <a:t>  where</a:t>
+            </a:r>
+          </a:p>
+          <a:p>
+            <a:r>
+              <a:rPr lang="en-IE" dirty="0"/>
+              <a:t>    </a:t>
+            </a:r>
+            <a:r>
+              <a:rPr lang="en-IE" dirty="0" err="1"/>
+              <a:t>nametext</a:t>
+            </a:r>
+            <a:r>
+              <a:rPr lang="en-IE" dirty="0"/>
+              <a:t> = </a:t>
+            </a:r>
+            <a:r>
+              <a:rPr lang="en-IE" dirty="0" err="1"/>
+              <a:t>snd</a:t>
+            </a:r>
+            <a:r>
+              <a:rPr lang="en-IE" dirty="0"/>
+              <a:t> name ++ ", " ++ </a:t>
+            </a:r>
+            <a:r>
+              <a:rPr lang="en-IE" dirty="0" err="1"/>
+              <a:t>fst</a:t>
+            </a:r>
+            <a:r>
+              <a:rPr lang="en-IE" dirty="0"/>
+              <a:t> name</a:t>
             </a:r>
           </a:p>
         </p:txBody>
@@ -16479,8 +16899,8 @@
         </p:nvSpPr>
         <p:spPr bwMode="auto">
           <a:xfrm>
-            <a:off x="1422400" y="1815665"/>
-            <a:ext cx="8415867" cy="1858867"/>
+            <a:off x="1490133" y="1805571"/>
+            <a:ext cx="9275838" cy="1815882"/>
           </a:xfrm>
           <a:prstGeom prst="rect">
             <a:avLst/>
@@ -16500,30 +16920,75 @@
           <a:lstStyle/>
           <a:p>
             <a:r>
+              <a:rPr lang="en-IE" b="1" dirty="0" err="1"/>
+              <a:t>carOffice</a:t>
+            </a:r>
+            <a:r>
               <a:rPr lang="en-IE" b="1" dirty="0"/>
-              <a:t>itcOffice</a:t>
+              <a:t> </a:t>
             </a:r>
             <a:r>
               <a:rPr lang="en-IE" dirty="0"/>
-              <a:t> :: Name -&gt; String</a:t>
-            </a:r>
-          </a:p>
-          <a:p>
+              <a:t>:: Name -&gt; String</a:t>
+            </a:r>
+          </a:p>
+          <a:p>
+            <a:r>
+              <a:rPr lang="en-IE" dirty="0" err="1"/>
+              <a:t>carOffice</a:t>
+            </a:r>
             <a:r>
               <a:rPr lang="en-IE" dirty="0"/>
-              <a:t>itcOffice name = nametext ++ ", " ++ office Itc</a:t>
-            </a:r>
-          </a:p>
-          <a:p>
+              <a:t> name =   </a:t>
+            </a:r>
+            <a:r>
+              <a:rPr lang="en-IE" dirty="0" err="1"/>
+              <a:t>nametext</a:t>
+            </a:r>
             <a:r>
               <a:rPr lang="en-IE" dirty="0"/>
-              <a:t>    where</a:t>
-            </a:r>
+              <a:t> ++ ",  " ++ office </a:t>
+            </a:r>
+            <a:r>
+              <a:rPr lang="en-IE" dirty="0" err="1"/>
+              <a:t>CarSETU</a:t>
+            </a:r>
+            <a:endParaRPr lang="en-IE" dirty="0"/>
           </a:p>
           <a:p>
             <a:r>
               <a:rPr lang="en-IE" dirty="0"/>
-              <a:t>        nametext = fst name ++ " " ++ snd name</a:t>
+              <a:t>  where</a:t>
+            </a:r>
+          </a:p>
+          <a:p>
+            <a:r>
+              <a:rPr lang="en-IE" dirty="0"/>
+              <a:t>    </a:t>
+            </a:r>
+            <a:r>
+              <a:rPr lang="en-IE" dirty="0" err="1"/>
+              <a:t>nametext</a:t>
+            </a:r>
+            <a:r>
+              <a:rPr lang="en-IE" dirty="0"/>
+              <a:t> = </a:t>
+            </a:r>
+            <a:r>
+              <a:rPr lang="en-IE" dirty="0" err="1"/>
+              <a:t>fst</a:t>
+            </a:r>
+            <a:r>
+              <a:rPr lang="en-IE" dirty="0"/>
+              <a:t> name ++ "  " ++ </a:t>
+            </a:r>
+            <a:r>
+              <a:rPr lang="en-IE" dirty="0" err="1"/>
+              <a:t>snd</a:t>
+            </a:r>
+            <a:r>
+              <a:rPr lang="en-IE" dirty="0"/>
+              <a:t> name</a:t>
             </a:r>
           </a:p>
         </p:txBody>
@@ -16799,7 +17264,31 @@
           <a:p>
             <a:r>
               <a:rPr lang="en-IE" dirty="0"/>
-              <a:t>data Location = Wit | Itc | Oth</a:t>
+              <a:t>data  Location = </a:t>
+            </a:r>
+            <a:r>
+              <a:rPr lang="en-IE" dirty="0" err="1"/>
+              <a:t>WatSETU</a:t>
+            </a:r>
+            <a:r>
+              <a:rPr lang="en-IE" dirty="0"/>
+              <a:t> | </a:t>
+            </a:r>
+            <a:r>
+              <a:rPr lang="en-IE" dirty="0" err="1"/>
+              <a:t>CarSETU</a:t>
+            </a:r>
+            <a:r>
+              <a:rPr lang="en-IE" dirty="0"/>
+              <a:t>| </a:t>
+            </a:r>
+            <a:r>
+              <a:rPr lang="en-IE" dirty="0" err="1"/>
+              <a:t>WexSETU</a:t>
+            </a:r>
+            <a:r>
+              <a:rPr lang="en-IE" dirty="0"/>
+              <a:t> </a:t>
             </a:r>
           </a:p>
           <a:p>
@@ -16827,19 +17316,51 @@
           <a:p>
             <a:r>
               <a:rPr lang="en-IE" dirty="0"/>
-              <a:t>office Wit = "Waterford institute of Technology, Cork Road, Waterford, Ireland, X91 K0EK."</a:t>
-            </a:r>
-          </a:p>
-          <a:p>
+              <a:t>office </a:t>
+            </a:r>
+            <a:r>
+              <a:rPr lang="en-IE" dirty="0" err="1"/>
+              <a:t>WatSETU</a:t>
+            </a:r>
             <a:r>
               <a:rPr lang="en-IE" dirty="0"/>
-              <a:t>office Itc = "Carlow Institute of Technology, Dublin Road, Carlow, Ireland, R93 V960."</a:t>
+              <a:t> = "SETU (Waterford Campus), Cork Road, Waterford, Ireland, X91 K0EK."</a:t>
             </a:r>
           </a:p>
           <a:p>
             <a:r>
               <a:rPr lang="en-IE" dirty="0"/>
-              <a:t>office Oth = "OTH Regensburg, Seybothstraße 2, 93053 Regensburg, Germany."</a:t>
+              <a:t>office </a:t>
+            </a:r>
+            <a:r>
+              <a:rPr lang="en-IE" dirty="0" err="1"/>
+              <a:t>CarSETU</a:t>
+            </a:r>
+            <a:r>
+              <a:rPr lang="en-IE" dirty="0"/>
+              <a:t>= "SETU (Carlow Campus), Dublin Road, Carlow, Ireland, R93 V960."</a:t>
+            </a:r>
+          </a:p>
+          <a:p>
+            <a:r>
+              <a:rPr lang="en-IE" dirty="0"/>
+              <a:t>office </a:t>
+            </a:r>
+            <a:r>
+              <a:rPr lang="en-IE" dirty="0" err="1"/>
+              <a:t>WexSETU</a:t>
+            </a:r>
+            <a:r>
+              <a:rPr lang="en-IE" dirty="0"/>
+              <a:t> = "SETU (Wexford Campus), Summerhill Rd, </a:t>
+            </a:r>
+            <a:r>
+              <a:rPr lang="en-IE" dirty="0" err="1"/>
+              <a:t>Townparks</a:t>
+            </a:r>
+            <a:r>
+              <a:rPr lang="en-IE" dirty="0"/>
+              <a:t>, Wexford, Y35 KA07."</a:t>
             </a:r>
           </a:p>
         </p:txBody>
@@ -20507,8 +21028,12 @@
           <a:lstStyle/>
           <a:p>
             <a:r>
+              <a:rPr lang="en-US" sz="2400"/>
+              <a:t>With </a:t>
+            </a:r>
+            <a:r>
               <a:rPr lang="en-US" sz="2400" dirty="0"/>
-              <a:t>With the power of the lambda function</a:t>
+              <a:t>the power of the lambda function</a:t>
             </a:r>
           </a:p>
         </p:txBody>

</xml_diff>